<commit_message>
better naming and fix of MT issue
</commit_message>
<xml_diff>
--- a/The history of UI architecture design approaches.pptx
+++ b/The history of UI architecture design approaches.pptx
@@ -5,13 +5,14 @@
     <p:sldMasterId id="2147483712" r:id="rId4"/>
   </p:sldMasterIdLst>
   <p:notesMasterIdLst>
-    <p:notesMasterId r:id="rId9"/>
+    <p:notesMasterId r:id="rId10"/>
   </p:notesMasterIdLst>
   <p:sldIdLst>
     <p:sldId id="257" r:id="rId5"/>
     <p:sldId id="259" r:id="rId6"/>
     <p:sldId id="260" r:id="rId7"/>
     <p:sldId id="261" r:id="rId8"/>
+    <p:sldId id="262" r:id="rId9"/>
   </p:sldIdLst>
   <p:sldSz cx="12192000" cy="6858000"/>
   <p:notesSz cx="6858000" cy="9144000"/>
@@ -5564,6 +5565,177 @@
     <p:extLst>
       <p:ext uri="{BB962C8B-B14F-4D97-AF65-F5344CB8AC3E}">
         <p14:creationId xmlns:p14="http://schemas.microsoft.com/office/powerpoint/2010/main" val="3895511216"/>
+      </p:ext>
+    </p:extLst>
+  </p:cSld>
+  <p:clrMapOvr>
+    <a:masterClrMapping/>
+  </p:clrMapOvr>
+</p:sld>
+</file>
+
+<file path=ppt/slides/slide5.xml><?xml version="1.0" encoding="utf-8"?>
+<p:sld xmlns:a="http://schemas.openxmlformats.org/drawingml/2006/main" xmlns:r="http://schemas.openxmlformats.org/officeDocument/2006/relationships" xmlns:p="http://schemas.openxmlformats.org/presentationml/2006/main">
+  <p:cSld>
+    <p:spTree>
+      <p:nvGrpSpPr>
+        <p:cNvPr id="1" name="">
+          <a:extLst>
+            <a:ext uri="{FF2B5EF4-FFF2-40B4-BE49-F238E27FC236}">
+              <a16:creationId xmlns:a16="http://schemas.microsoft.com/office/drawing/2014/main" id="{4E0636AA-B465-80D6-7A84-863B6042050C}"/>
+            </a:ext>
+          </a:extLst>
+        </p:cNvPr>
+        <p:cNvGrpSpPr/>
+        <p:nvPr/>
+      </p:nvGrpSpPr>
+      <p:grpSpPr>
+        <a:xfrm>
+          <a:off x="0" y="0"/>
+          <a:ext cx="0" cy="0"/>
+          <a:chOff x="0" y="0"/>
+          <a:chExt cx="0" cy="0"/>
+        </a:xfrm>
+      </p:grpSpPr>
+      <p:sp>
+        <p:nvSpPr>
+          <p:cNvPr id="2" name="Title 1">
+            <a:extLst>
+              <a:ext uri="{FF2B5EF4-FFF2-40B4-BE49-F238E27FC236}">
+                <a16:creationId xmlns:a16="http://schemas.microsoft.com/office/drawing/2014/main" id="{872AD305-D15C-CBC7-72F2-29B230F9CEA4}"/>
+              </a:ext>
+            </a:extLst>
+          </p:cNvPr>
+          <p:cNvSpPr>
+            <a:spLocks noGrp="1"/>
+          </p:cNvSpPr>
+          <p:nvPr>
+            <p:ph type="title"/>
+          </p:nvPr>
+        </p:nvSpPr>
+        <p:spPr>
+          <a:xfrm>
+            <a:off x="581192" y="702156"/>
+            <a:ext cx="11029616" cy="506302"/>
+          </a:xfrm>
+        </p:spPr>
+        <p:txBody>
+          <a:bodyPr>
+            <a:normAutofit fontScale="90000"/>
+          </a:bodyPr>
+          <a:lstStyle/>
+          <a:p>
+            <a:r>
+              <a:rPr lang="en-US" dirty="0"/>
+              <a:t>Back in the days. Code-behind. Issues</a:t>
+            </a:r>
+          </a:p>
+        </p:txBody>
+      </p:sp>
+      <p:sp>
+        <p:nvSpPr>
+          <p:cNvPr id="3" name="Content Placeholder 2">
+            <a:extLst>
+              <a:ext uri="{FF2B5EF4-FFF2-40B4-BE49-F238E27FC236}">
+                <a16:creationId xmlns:a16="http://schemas.microsoft.com/office/drawing/2014/main" id="{DBA27689-F402-23F1-E6E0-5186F974C629}"/>
+              </a:ext>
+            </a:extLst>
+          </p:cNvPr>
+          <p:cNvSpPr>
+            <a:spLocks noGrp="1"/>
+          </p:cNvSpPr>
+          <p:nvPr>
+            <p:ph idx="1"/>
+          </p:nvPr>
+        </p:nvSpPr>
+        <p:spPr>
+          <a:xfrm>
+            <a:off x="581192" y="1596118"/>
+            <a:ext cx="11029615" cy="4720090"/>
+          </a:xfrm>
+        </p:spPr>
+        <p:txBody>
+          <a:bodyPr anchor="t"/>
+          <a:lstStyle/>
+          <a:p>
+            <a:pPr algn="just"/>
+            <a:r>
+              <a:rPr lang="en-US" b="1" dirty="0"/>
+              <a:t>Concurrency</a:t>
+            </a:r>
+          </a:p>
+          <a:p>
+            <a:pPr algn="just"/>
+            <a:r>
+              <a:rPr lang="en-US" b="1"/>
+              <a:t>MT cancelation</a:t>
+            </a:r>
+            <a:endParaRPr lang="en-US" b="1" dirty="0"/>
+          </a:p>
+        </p:txBody>
+      </p:sp>
+      <p:sp>
+        <p:nvSpPr>
+          <p:cNvPr id="4" name="Footer Placeholder 3">
+            <a:extLst>
+              <a:ext uri="{FF2B5EF4-FFF2-40B4-BE49-F238E27FC236}">
+                <a16:creationId xmlns:a16="http://schemas.microsoft.com/office/drawing/2014/main" id="{D0906E6C-B99D-1779-D07F-0E51CE7D4DFA}"/>
+              </a:ext>
+            </a:extLst>
+          </p:cNvPr>
+          <p:cNvSpPr>
+            <a:spLocks noGrp="1"/>
+          </p:cNvSpPr>
+          <p:nvPr>
+            <p:ph type="ftr" sz="quarter" idx="11"/>
+          </p:nvPr>
+        </p:nvSpPr>
+        <p:spPr/>
+        <p:txBody>
+          <a:bodyPr/>
+          <a:lstStyle/>
+          <a:p>
+            <a:r>
+              <a:rPr lang="en-US"/>
+              <a:t>Fedor Reznik</a:t>
+            </a:r>
+            <a:endParaRPr lang="en-US" dirty="0"/>
+          </a:p>
+        </p:txBody>
+      </p:sp>
+      <p:sp>
+        <p:nvSpPr>
+          <p:cNvPr id="5" name="Slide Number Placeholder 4">
+            <a:extLst>
+              <a:ext uri="{FF2B5EF4-FFF2-40B4-BE49-F238E27FC236}">
+                <a16:creationId xmlns:a16="http://schemas.microsoft.com/office/drawing/2014/main" id="{A94FCD88-0447-0EB8-59B0-9652AD4D859E}"/>
+              </a:ext>
+            </a:extLst>
+          </p:cNvPr>
+          <p:cNvSpPr>
+            <a:spLocks noGrp="1"/>
+          </p:cNvSpPr>
+          <p:nvPr>
+            <p:ph type="sldNum" sz="quarter" idx="12"/>
+          </p:nvPr>
+        </p:nvSpPr>
+        <p:spPr/>
+        <p:txBody>
+          <a:bodyPr/>
+          <a:lstStyle/>
+          <a:p>
+            <a:fld id="{3A98EE3D-8CD1-4C3F-BD1C-C98C9596463C}" type="slidenum">
+              <a:rPr lang="en-US" smtClean="0"/>
+              <a:t>5</a:t>
+            </a:fld>
+            <a:endParaRPr lang="en-US" dirty="0"/>
+          </a:p>
+        </p:txBody>
+      </p:sp>
+    </p:spTree>
+    <p:extLst>
+      <p:ext uri="{BB962C8B-B14F-4D97-AF65-F5344CB8AC3E}">
+        <p14:creationId xmlns:p14="http://schemas.microsoft.com/office/powerpoint/2010/main" val="577363430"/>
       </p:ext>
     </p:extLst>
   </p:cSld>
@@ -6147,15 +6319,6 @@
 </file>
 
 <file path=customXml/item2.xml><?xml version="1.0" encoding="utf-8"?>
-<?mso-contentType ?>
-<FormTemplates xmlns="http://schemas.microsoft.com/sharepoint/v3/contenttype/forms">
-  <Display>DocumentLibraryForm</Display>
-  <Edit>DocumentLibraryForm</Edit>
-  <New>DocumentLibraryForm</New>
-</FormTemplates>
-</file>
-
-<file path=customXml/item3.xml><?xml version="1.0" encoding="utf-8"?>
 <ct:contentTypeSchema xmlns:ct="http://schemas.microsoft.com/office/2006/metadata/contentType" xmlns:ma="http://schemas.microsoft.com/office/2006/metadata/properties/metaAttributes" ct:_="" ma:_="" ma:contentTypeName="Document" ma:contentTypeID="0x01010079F111ED35F8CC479449609E8A0923A6" ma:contentTypeVersion="12" ma:contentTypeDescription="Create a new document." ma:contentTypeScope="" ma:versionID="a410dd7f93c95333ffa1b60ed6adedd1">
   <xsd:schema xmlns:xsd="http://www.w3.org/2001/XMLSchema" xmlns:xs="http://www.w3.org/2001/XMLSchema" xmlns:p="http://schemas.microsoft.com/office/2006/metadata/properties" xmlns:ns2="71af3243-3dd4-4a8d-8c0d-dd76da1f02a5" xmlns:ns3="16c05727-aa75-4e4a-9b5f-8a80a1165891" targetNamespace="http://schemas.microsoft.com/office/2006/metadata/properties" ma:root="true" ma:fieldsID="a936d9baba76aa3866493feff160faab" ns2:_="" ns3:_="">
     <xsd:import namespace="71af3243-3dd4-4a8d-8c0d-dd76da1f02a5"/>
@@ -6376,6 +6539,15 @@
 </ct:contentTypeSchema>
 </file>
 
+<file path=customXml/item3.xml><?xml version="1.0" encoding="utf-8"?>
+<?mso-contentType ?>
+<FormTemplates xmlns="http://schemas.microsoft.com/sharepoint/v3/contenttype/forms">
+  <Display>DocumentLibraryForm</Display>
+  <Edit>DocumentLibraryForm</Edit>
+  <New>DocumentLibraryForm</New>
+</FormTemplates>
+</file>
+
 <file path=customXml/itemProps1.xml><?xml version="1.0" encoding="utf-8"?>
 <ds:datastoreItem xmlns:ds="http://schemas.openxmlformats.org/officeDocument/2006/customXml" ds:itemID="{8D289AE2-D2AE-49D1-AFAC-3A79F6794255}">
   <ds:schemaRefs>
@@ -6387,14 +6559,6 @@
 </file>
 
 <file path=customXml/itemProps2.xml><?xml version="1.0" encoding="utf-8"?>
-<ds:datastoreItem xmlns:ds="http://schemas.openxmlformats.org/officeDocument/2006/customXml" ds:itemID="{927BD4C1-B6B1-4715-ABF9-E660A51A4EA0}">
-  <ds:schemaRefs>
-    <ds:schemaRef ds:uri="http://schemas.microsoft.com/sharepoint/v3/contenttype/forms"/>
-  </ds:schemaRefs>
-</ds:datastoreItem>
-</file>
-
-<file path=customXml/itemProps3.xml><?xml version="1.0" encoding="utf-8"?>
 <ds:datastoreItem xmlns:ds="http://schemas.openxmlformats.org/officeDocument/2006/customXml" ds:itemID="{41E7CA09-9778-4414-AE97-8064B12DA30E}">
   <ds:schemaRefs>
     <ds:schemaRef ds:uri="http://schemas.microsoft.com/office/2006/metadata/contentType"/>
@@ -6411,4 +6575,12 @@
     <ds:schemaRef ds:uri="http://schemas.microsoft.com/internal/obd"/>
   </ds:schemaRefs>
 </ds:datastoreItem>
+</file>
+
+<file path=customXml/itemProps3.xml><?xml version="1.0" encoding="utf-8"?>
+<ds:datastoreItem xmlns:ds="http://schemas.openxmlformats.org/officeDocument/2006/customXml" ds:itemID="{927BD4C1-B6B1-4715-ABF9-E660A51A4EA0}">
+  <ds:schemaRefs>
+    <ds:schemaRef ds:uri="http://schemas.microsoft.com/sharepoint/v3/contenttype/forms"/>
+  </ds:schemaRefs>
+</ds:datastoreItem>
 </file>
</xml_diff>